<commit_message>
Correção do slide sobre manipulação de estados
</commit_message>
<xml_diff>
--- a/Módulo 09 - Manipulação de estados/Módulo IX - Manipulação de Estados.pptx
+++ b/Módulo 09 - Manipulação de estados/Módulo IX - Manipulação de Estados.pptx
@@ -166,6 +166,7 @@
     <p1510:client id="{4CF41240-5343-B8AD-F2BF-3420B659A72E}" v="24" dt="2024-11-28T19:09:27.215"/>
     <p1510:client id="{75EDE64F-B7A3-733E-560C-33FEA0B369B3}" v="752" dt="2024-11-28T23:09:35.402"/>
     <p1510:client id="{C6FB326A-1DEB-86C9-3B68-45930B22FC66}" v="189" dt="2024-11-28T20:24:27.532"/>
+    <p1510:client id="{D3AA0537-EDC4-B3A1-7D0C-664059F3FEB3}" v="4" dt="2024-11-29T13:05:42.082"/>
   </p1510:revLst>
 </p1510:revInfo>
 </file>
@@ -6947,7 +6948,7 @@
               </a:lnSpc>
             </a:pPr>
             <a:r>
-              <a:rPr lang="en-US" sz="5000" spc="300" dirty="0">
+              <a:rPr lang="en-US" sz="5000" b="1" spc="300" dirty="0">
                 <a:solidFill>
                   <a:srgbClr val="2B4A9D"/>
                 </a:solidFill>
@@ -6957,7 +6958,7 @@
               <a:t>No </a:t>
             </a:r>
             <a:r>
-              <a:rPr lang="en-US" sz="5000" spc="300" err="1">
+              <a:rPr lang="en-US" sz="5000" b="1" spc="300" err="1">
                 <a:solidFill>
                   <a:srgbClr val="2B4A9D"/>
                 </a:solidFill>
@@ -6967,7 +6968,7 @@
               <a:t>próximo</a:t>
             </a:r>
             <a:r>
-              <a:rPr lang="en-US" sz="5000" spc="300" dirty="0">
+              <a:rPr lang="en-US" sz="5000" b="1" spc="300" dirty="0">
                 <a:solidFill>
                   <a:srgbClr val="2B4A9D"/>
                 </a:solidFill>
@@ -6977,7 +6978,7 @@
               <a:t> </a:t>
             </a:r>
             <a:r>
-              <a:rPr lang="en-US" sz="5000" spc="300" err="1">
+              <a:rPr lang="en-US" sz="5000" b="1" spc="300" err="1">
                 <a:solidFill>
                   <a:srgbClr val="2B4A9D"/>
                 </a:solidFill>
@@ -6987,7 +6988,7 @@
               <a:t>módulo</a:t>
             </a:r>
             <a:r>
-              <a:rPr lang="en-US" sz="5000" spc="300" dirty="0">
+              <a:rPr lang="en-US" sz="5000" b="1" spc="300" dirty="0">
                 <a:solidFill>
                   <a:srgbClr val="2B4A9D"/>
                 </a:solidFill>
@@ -6997,7 +6998,7 @@
               <a:t> </a:t>
             </a:r>
             <a:r>
-              <a:rPr lang="en-US" sz="5000" spc="300" err="1">
+              <a:rPr lang="en-US" sz="5000" b="1" spc="300" err="1">
                 <a:solidFill>
                   <a:srgbClr val="2B4A9D"/>
                 </a:solidFill>
@@ -7007,7 +7008,7 @@
               <a:t>vamos</a:t>
             </a:r>
             <a:r>
-              <a:rPr lang="en-US" sz="5000" spc="300" dirty="0">
+              <a:rPr lang="en-US" sz="5000" b="1" spc="300" dirty="0">
                 <a:solidFill>
                   <a:srgbClr val="2B4A9D"/>
                 </a:solidFill>
@@ -7017,7 +7018,7 @@
               <a:t> </a:t>
             </a:r>
             <a:r>
-              <a:rPr lang="en-US" sz="5000" spc="300" err="1">
+              <a:rPr lang="en-US" sz="5000" b="1" spc="300" err="1">
                 <a:solidFill>
                   <a:srgbClr val="2B4A9D"/>
                 </a:solidFill>
@@ -7027,7 +7028,7 @@
               <a:t>aprender</a:t>
             </a:r>
             <a:r>
-              <a:rPr lang="en-US" sz="5000" spc="300" dirty="0">
+              <a:rPr lang="en-US" sz="5000" b="1" spc="300" dirty="0">
                 <a:solidFill>
                   <a:srgbClr val="2B4A9D"/>
                 </a:solidFill>
@@ -7037,7 +7038,7 @@
               <a:t> </a:t>
             </a:r>
             <a:r>
-              <a:rPr lang="en-US" sz="5000" spc="300" err="1">
+              <a:rPr lang="en-US" sz="5000" b="1" spc="300" err="1">
                 <a:solidFill>
                   <a:srgbClr val="2B4A9D"/>
                 </a:solidFill>
@@ -7047,7 +7048,7 @@
               <a:t>sobre</a:t>
             </a:r>
             <a:r>
-              <a:rPr lang="en-US" sz="5000" spc="300" dirty="0">
+              <a:rPr lang="en-US" sz="5000" b="1" spc="300" dirty="0">
                 <a:solidFill>
                   <a:srgbClr val="2B4A9D"/>
                 </a:solidFill>
@@ -7057,7 +7058,7 @@
               <a:t> </a:t>
             </a:r>
             <a:r>
-              <a:rPr lang="en-US" sz="5000" spc="300" err="1">
+              <a:rPr lang="en-US" sz="5000" b="1" spc="300" err="1">
                 <a:solidFill>
                   <a:srgbClr val="2B4A9D"/>
                 </a:solidFill>
@@ -7067,7 +7068,7 @@
               <a:t>armazenamento</a:t>
             </a:r>
             <a:r>
-              <a:rPr lang="en-US" sz="5000" spc="300" dirty="0">
+              <a:rPr lang="en-US" sz="5000" b="1" spc="300" dirty="0">
                 <a:solidFill>
                   <a:srgbClr val="2B4A9D"/>
                 </a:solidFill>
@@ -7077,7 +7078,7 @@
               <a:t> </a:t>
             </a:r>
             <a:r>
-              <a:rPr lang="en-US" sz="5000" spc="300" err="1">
+              <a:rPr lang="en-US" sz="5000" b="1" spc="300" err="1">
                 <a:solidFill>
                   <a:srgbClr val="2B4A9D"/>
                 </a:solidFill>
@@ -7087,7 +7088,7 @@
               <a:t>interno</a:t>
             </a:r>
             <a:r>
-              <a:rPr lang="en-US" sz="5000" spc="300" dirty="0">
+              <a:rPr lang="en-US" sz="5000" b="1" spc="300" dirty="0">
                 <a:solidFill>
                   <a:srgbClr val="2B4A9D"/>
                 </a:solidFill>
@@ -7097,7 +7098,7 @@
               <a:t> com </a:t>
             </a:r>
             <a:r>
-              <a:rPr lang="en-US" sz="5000" spc="300" err="1">
+              <a:rPr lang="en-US" sz="5000" b="1" spc="300" err="1">
                 <a:solidFill>
                   <a:srgbClr val="2B4A9D"/>
                 </a:solidFill>
@@ -7107,7 +7108,7 @@
               <a:t>arquivos</a:t>
             </a:r>
             <a:r>
-              <a:rPr lang="en-US" sz="5000" spc="300" dirty="0">
+              <a:rPr lang="en-US" sz="5000" b="1" spc="300" dirty="0">
                 <a:solidFill>
                   <a:srgbClr val="2B4A9D"/>
                 </a:solidFill>

</xml_diff>